<commit_message>
Update based on training on 2016-12-10
</commit_message>
<xml_diff>
--- a/learning/Arduino Workshop EduShield.pptx
+++ b/learning/Arduino Workshop EduShield.pptx
@@ -5,17 +5,17 @@
     <p:sldMasterId id="2147483648" r:id="rId2"/>
   </p:sldMasterIdLst>
   <p:notesMasterIdLst>
-    <p:notesMasterId r:id="rId26"/>
+    <p:notesMasterId r:id="rId28"/>
   </p:notesMasterIdLst>
   <p:handoutMasterIdLst>
-    <p:handoutMasterId r:id="rId27"/>
+    <p:handoutMasterId r:id="rId29"/>
   </p:handoutMasterIdLst>
   <p:sldIdLst>
     <p:sldId id="256" r:id="rId3"/>
     <p:sldId id="289" r:id="rId4"/>
     <p:sldId id="280" r:id="rId5"/>
-    <p:sldId id="275" r:id="rId6"/>
-    <p:sldId id="278" r:id="rId7"/>
+    <p:sldId id="278" r:id="rId6"/>
+    <p:sldId id="275" r:id="rId7"/>
     <p:sldId id="292" r:id="rId8"/>
     <p:sldId id="257" r:id="rId9"/>
     <p:sldId id="265" r:id="rId10"/>
@@ -23,17 +23,19 @@
     <p:sldId id="266" r:id="rId12"/>
     <p:sldId id="271" r:id="rId13"/>
     <p:sldId id="274" r:id="rId14"/>
-    <p:sldId id="260" r:id="rId15"/>
-    <p:sldId id="268" r:id="rId16"/>
-    <p:sldId id="281" r:id="rId17"/>
-    <p:sldId id="259" r:id="rId18"/>
-    <p:sldId id="261" r:id="rId19"/>
+    <p:sldId id="259" r:id="rId15"/>
+    <p:sldId id="261" r:id="rId16"/>
+    <p:sldId id="260" r:id="rId17"/>
+    <p:sldId id="268" r:id="rId18"/>
+    <p:sldId id="281" r:id="rId19"/>
     <p:sldId id="290" r:id="rId20"/>
     <p:sldId id="270" r:id="rId21"/>
     <p:sldId id="273" r:id="rId22"/>
     <p:sldId id="291" r:id="rId23"/>
     <p:sldId id="296" r:id="rId24"/>
     <p:sldId id="293" r:id="rId25"/>
+    <p:sldId id="297" r:id="rId26"/>
+    <p:sldId id="298" r:id="rId27"/>
   </p:sldIdLst>
   <p:sldSz cx="12192000" cy="6858000"/>
   <p:notesSz cx="6858000" cy="9144000"/>
@@ -233,7 +235,7 @@
           <a:p>
             <a:fld id="{27436498-F781-46EC-B523-A536DD5DC2E4}" type="datetimeFigureOut">
               <a:rPr lang="en-US" smtClean="0"/>
-              <a:t>12/3/2016</a:t>
+              <a:t>12/10/2016</a:t>
             </a:fld>
             <a:endParaRPr lang="en-US"/>
           </a:p>
@@ -398,7 +400,7 @@
           <a:p>
             <a:fld id="{5FDCBA4C-DA75-42DF-B0FA-A912DAFD6C11}" type="datetimeFigureOut">
               <a:rPr lang="en-US" smtClean="0"/>
-              <a:t>12/3/2016</a:t>
+              <a:t>12/10/2016</a:t>
             </a:fld>
             <a:endParaRPr lang="en-US"/>
           </a:p>
@@ -1022,7 +1024,7 @@
     </p:spTree>
     <p:extLst>
       <p:ext uri="{BB962C8B-B14F-4D97-AF65-F5344CB8AC3E}">
-        <p14:creationId xmlns:p14="http://schemas.microsoft.com/office/powerpoint/2010/main" val="920329486"/>
+        <p14:creationId xmlns:p14="http://schemas.microsoft.com/office/powerpoint/2010/main" val="374334627"/>
       </p:ext>
     </p:extLst>
   </p:cSld>
@@ -1144,7 +1146,7 @@
     </p:spTree>
     <p:extLst>
       <p:ext uri="{BB962C8B-B14F-4D97-AF65-F5344CB8AC3E}">
-        <p14:creationId xmlns:p14="http://schemas.microsoft.com/office/powerpoint/2010/main" val="2114914965"/>
+        <p14:creationId xmlns:p14="http://schemas.microsoft.com/office/powerpoint/2010/main" val="1869369405"/>
       </p:ext>
     </p:extLst>
   </p:cSld>
@@ -1266,7 +1268,7 @@
     </p:spTree>
     <p:extLst>
       <p:ext uri="{BB962C8B-B14F-4D97-AF65-F5344CB8AC3E}">
-        <p14:creationId xmlns:p14="http://schemas.microsoft.com/office/powerpoint/2010/main" val="505964295"/>
+        <p14:creationId xmlns:p14="http://schemas.microsoft.com/office/powerpoint/2010/main" val="920329486"/>
       </p:ext>
     </p:extLst>
   </p:cSld>
@@ -1388,7 +1390,7 @@
     </p:spTree>
     <p:extLst>
       <p:ext uri="{BB962C8B-B14F-4D97-AF65-F5344CB8AC3E}">
-        <p14:creationId xmlns:p14="http://schemas.microsoft.com/office/powerpoint/2010/main" val="374334627"/>
+        <p14:creationId xmlns:p14="http://schemas.microsoft.com/office/powerpoint/2010/main" val="2114914965"/>
       </p:ext>
     </p:extLst>
   </p:cSld>
@@ -1510,7 +1512,7 @@
     </p:spTree>
     <p:extLst>
       <p:ext uri="{BB962C8B-B14F-4D97-AF65-F5344CB8AC3E}">
-        <p14:creationId xmlns:p14="http://schemas.microsoft.com/office/powerpoint/2010/main" val="1869369405"/>
+        <p14:creationId xmlns:p14="http://schemas.microsoft.com/office/powerpoint/2010/main" val="505964295"/>
       </p:ext>
     </p:extLst>
   </p:cSld>
@@ -2130,6 +2132,250 @@
 </p:notes>
 </file>
 
+<file path=ppt/notesSlides/notesSlide20.xml><?xml version="1.0" encoding="utf-8"?>
+<p:notes xmlns:a="http://schemas.openxmlformats.org/drawingml/2006/main" xmlns:r="http://schemas.openxmlformats.org/officeDocument/2006/relationships" xmlns:p="http://schemas.openxmlformats.org/presentationml/2006/main">
+  <p:cSld>
+    <p:spTree>
+      <p:nvGrpSpPr>
+        <p:cNvPr id="1" name=""/>
+        <p:cNvGrpSpPr/>
+        <p:nvPr/>
+      </p:nvGrpSpPr>
+      <p:grpSpPr>
+        <a:xfrm>
+          <a:off x="0" y="0"/>
+          <a:ext cx="0" cy="0"/>
+          <a:chOff x="0" y="0"/>
+          <a:chExt cx="0" cy="0"/>
+        </a:xfrm>
+      </p:grpSpPr>
+      <p:sp>
+        <p:nvSpPr>
+          <p:cNvPr id="2" name="Slide Image Placeholder 1"/>
+          <p:cNvSpPr>
+            <a:spLocks noGrp="1" noRot="1" noChangeAspect="1"/>
+          </p:cNvSpPr>
+          <p:nvPr>
+            <p:ph type="sldImg"/>
+          </p:nvPr>
+        </p:nvSpPr>
+        <p:spPr/>
+      </p:sp>
+      <p:sp>
+        <p:nvSpPr>
+          <p:cNvPr id="3" name="Notes Placeholder 2"/>
+          <p:cNvSpPr>
+            <a:spLocks noGrp="1"/>
+          </p:cNvSpPr>
+          <p:nvPr>
+            <p:ph type="body" idx="1"/>
+          </p:nvPr>
+        </p:nvSpPr>
+        <p:spPr/>
+        <p:txBody>
+          <a:bodyPr/>
+          <a:lstStyle/>
+          <a:p>
+            <a:endParaRPr lang="en-US"/>
+          </a:p>
+        </p:txBody>
+      </p:sp>
+      <p:sp>
+        <p:nvSpPr>
+          <p:cNvPr id="4" name="Header Placeholder 3"/>
+          <p:cNvSpPr>
+            <a:spLocks noGrp="1"/>
+          </p:cNvSpPr>
+          <p:nvPr>
+            <p:ph type="hdr" sz="quarter" idx="10"/>
+          </p:nvPr>
+        </p:nvSpPr>
+        <p:spPr/>
+        <p:txBody>
+          <a:bodyPr/>
+          <a:lstStyle/>
+          <a:p>
+            <a:endParaRPr lang="en-US"/>
+          </a:p>
+        </p:txBody>
+      </p:sp>
+      <p:sp>
+        <p:nvSpPr>
+          <p:cNvPr id="5" name="Footer Placeholder 4"/>
+          <p:cNvSpPr>
+            <a:spLocks noGrp="1"/>
+          </p:cNvSpPr>
+          <p:nvPr>
+            <p:ph type="ftr" sz="quarter" idx="11"/>
+          </p:nvPr>
+        </p:nvSpPr>
+        <p:spPr/>
+        <p:txBody>
+          <a:bodyPr/>
+          <a:lstStyle/>
+          <a:p>
+            <a:endParaRPr lang="en-US"/>
+          </a:p>
+        </p:txBody>
+      </p:sp>
+      <p:sp>
+        <p:nvSpPr>
+          <p:cNvPr id="6" name="Slide Number Placeholder 5"/>
+          <p:cNvSpPr>
+            <a:spLocks noGrp="1"/>
+          </p:cNvSpPr>
+          <p:nvPr>
+            <p:ph type="sldNum" sz="quarter" idx="12"/>
+          </p:nvPr>
+        </p:nvSpPr>
+        <p:spPr/>
+        <p:txBody>
+          <a:bodyPr/>
+          <a:lstStyle/>
+          <a:p>
+            <a:fld id="{82B550C6-676C-41F5-8323-4618D7A55EA9}" type="slidenum">
+              <a:rPr lang="en-US" smtClean="0"/>
+              <a:t>24</a:t>
+            </a:fld>
+            <a:endParaRPr lang="en-US"/>
+          </a:p>
+        </p:txBody>
+      </p:sp>
+    </p:spTree>
+    <p:extLst>
+      <p:ext uri="{BB962C8B-B14F-4D97-AF65-F5344CB8AC3E}">
+        <p14:creationId xmlns:p14="http://schemas.microsoft.com/office/powerpoint/2010/main" val="538789181"/>
+      </p:ext>
+    </p:extLst>
+  </p:cSld>
+  <p:clrMapOvr>
+    <a:masterClrMapping/>
+  </p:clrMapOvr>
+</p:notes>
+</file>
+
+<file path=ppt/notesSlides/notesSlide21.xml><?xml version="1.0" encoding="utf-8"?>
+<p:notes xmlns:a="http://schemas.openxmlformats.org/drawingml/2006/main" xmlns:r="http://schemas.openxmlformats.org/officeDocument/2006/relationships" xmlns:p="http://schemas.openxmlformats.org/presentationml/2006/main">
+  <p:cSld>
+    <p:spTree>
+      <p:nvGrpSpPr>
+        <p:cNvPr id="1" name=""/>
+        <p:cNvGrpSpPr/>
+        <p:nvPr/>
+      </p:nvGrpSpPr>
+      <p:grpSpPr>
+        <a:xfrm>
+          <a:off x="0" y="0"/>
+          <a:ext cx="0" cy="0"/>
+          <a:chOff x="0" y="0"/>
+          <a:chExt cx="0" cy="0"/>
+        </a:xfrm>
+      </p:grpSpPr>
+      <p:sp>
+        <p:nvSpPr>
+          <p:cNvPr id="2" name="Slide Image Placeholder 1"/>
+          <p:cNvSpPr>
+            <a:spLocks noGrp="1" noRot="1" noChangeAspect="1"/>
+          </p:cNvSpPr>
+          <p:nvPr>
+            <p:ph type="sldImg"/>
+          </p:nvPr>
+        </p:nvSpPr>
+        <p:spPr/>
+      </p:sp>
+      <p:sp>
+        <p:nvSpPr>
+          <p:cNvPr id="3" name="Notes Placeholder 2"/>
+          <p:cNvSpPr>
+            <a:spLocks noGrp="1"/>
+          </p:cNvSpPr>
+          <p:nvPr>
+            <p:ph type="body" idx="1"/>
+          </p:nvPr>
+        </p:nvSpPr>
+        <p:spPr/>
+        <p:txBody>
+          <a:bodyPr/>
+          <a:lstStyle/>
+          <a:p>
+            <a:endParaRPr lang="en-US"/>
+          </a:p>
+        </p:txBody>
+      </p:sp>
+      <p:sp>
+        <p:nvSpPr>
+          <p:cNvPr id="4" name="Header Placeholder 3"/>
+          <p:cNvSpPr>
+            <a:spLocks noGrp="1"/>
+          </p:cNvSpPr>
+          <p:nvPr>
+            <p:ph type="hdr" sz="quarter" idx="10"/>
+          </p:nvPr>
+        </p:nvSpPr>
+        <p:spPr/>
+        <p:txBody>
+          <a:bodyPr/>
+          <a:lstStyle/>
+          <a:p>
+            <a:endParaRPr lang="en-US"/>
+          </a:p>
+        </p:txBody>
+      </p:sp>
+      <p:sp>
+        <p:nvSpPr>
+          <p:cNvPr id="5" name="Footer Placeholder 4"/>
+          <p:cNvSpPr>
+            <a:spLocks noGrp="1"/>
+          </p:cNvSpPr>
+          <p:nvPr>
+            <p:ph type="ftr" sz="quarter" idx="11"/>
+          </p:nvPr>
+        </p:nvSpPr>
+        <p:spPr/>
+        <p:txBody>
+          <a:bodyPr/>
+          <a:lstStyle/>
+          <a:p>
+            <a:endParaRPr lang="en-US"/>
+          </a:p>
+        </p:txBody>
+      </p:sp>
+      <p:sp>
+        <p:nvSpPr>
+          <p:cNvPr id="6" name="Slide Number Placeholder 5"/>
+          <p:cNvSpPr>
+            <a:spLocks noGrp="1"/>
+          </p:cNvSpPr>
+          <p:nvPr>
+            <p:ph type="sldNum" sz="quarter" idx="12"/>
+          </p:nvPr>
+        </p:nvSpPr>
+        <p:spPr/>
+        <p:txBody>
+          <a:bodyPr/>
+          <a:lstStyle/>
+          <a:p>
+            <a:fld id="{82B550C6-676C-41F5-8323-4618D7A55EA9}" type="slidenum">
+              <a:rPr lang="en-US" smtClean="0"/>
+              <a:t>25</a:t>
+            </a:fld>
+            <a:endParaRPr lang="en-US"/>
+          </a:p>
+        </p:txBody>
+      </p:sp>
+    </p:spTree>
+    <p:extLst>
+      <p:ext uri="{BB962C8B-B14F-4D97-AF65-F5344CB8AC3E}">
+        <p14:creationId xmlns:p14="http://schemas.microsoft.com/office/powerpoint/2010/main" val="831792239"/>
+      </p:ext>
+    </p:extLst>
+  </p:cSld>
+  <p:clrMapOvr>
+    <a:masterClrMapping/>
+  </p:clrMapOvr>
+</p:notes>
+</file>
+
 <file path=ppt/notesSlides/notesSlide3.xml><?xml version="1.0" encoding="utf-8"?>
 <p:notes xmlns:a="http://schemas.openxmlformats.org/drawingml/2006/main" xmlns:r="http://schemas.openxmlformats.org/officeDocument/2006/relationships" xmlns:p="http://schemas.openxmlformats.org/presentationml/2006/main">
   <p:cSld>
@@ -2242,7 +2488,7 @@
     </p:spTree>
     <p:extLst>
       <p:ext uri="{BB962C8B-B14F-4D97-AF65-F5344CB8AC3E}">
-        <p14:creationId xmlns:p14="http://schemas.microsoft.com/office/powerpoint/2010/main" val="2553165946"/>
+        <p14:creationId xmlns:p14="http://schemas.microsoft.com/office/powerpoint/2010/main" val="2797323176"/>
       </p:ext>
     </p:extLst>
   </p:cSld>
@@ -2364,7 +2610,7 @@
     </p:spTree>
     <p:extLst>
       <p:ext uri="{BB962C8B-B14F-4D97-AF65-F5344CB8AC3E}">
-        <p14:creationId xmlns:p14="http://schemas.microsoft.com/office/powerpoint/2010/main" val="2797323176"/>
+        <p14:creationId xmlns:p14="http://schemas.microsoft.com/office/powerpoint/2010/main" val="2553165946"/>
       </p:ext>
     </p:extLst>
   </p:cSld>
@@ -3115,7 +3361,7 @@
           <a:p>
             <a:fld id="{E67B6E39-B479-4EAD-9D1B-25702D54AA7D}" type="datetimeFigureOut">
               <a:rPr lang="cs-CZ" smtClean="0"/>
-              <a:t>03.12.2016</a:t>
+              <a:t>10.12.2016</a:t>
             </a:fld>
             <a:endParaRPr lang="cs-CZ"/>
           </a:p>
@@ -3285,7 +3531,7 @@
           <a:p>
             <a:fld id="{E67B6E39-B479-4EAD-9D1B-25702D54AA7D}" type="datetimeFigureOut">
               <a:rPr lang="cs-CZ" smtClean="0"/>
-              <a:t>03.12.2016</a:t>
+              <a:t>10.12.2016</a:t>
             </a:fld>
             <a:endParaRPr lang="cs-CZ"/>
           </a:p>
@@ -3465,7 +3711,7 @@
           <a:p>
             <a:fld id="{E67B6E39-B479-4EAD-9D1B-25702D54AA7D}" type="datetimeFigureOut">
               <a:rPr lang="cs-CZ" smtClean="0"/>
-              <a:t>03.12.2016</a:t>
+              <a:t>10.12.2016</a:t>
             </a:fld>
             <a:endParaRPr lang="cs-CZ"/>
           </a:p>
@@ -3635,7 +3881,7 @@
           <a:p>
             <a:fld id="{E67B6E39-B479-4EAD-9D1B-25702D54AA7D}" type="datetimeFigureOut">
               <a:rPr lang="cs-CZ" smtClean="0"/>
-              <a:t>03.12.2016</a:t>
+              <a:t>10.12.2016</a:t>
             </a:fld>
             <a:endParaRPr lang="cs-CZ"/>
           </a:p>
@@ -3881,7 +4127,7 @@
           <a:p>
             <a:fld id="{E67B6E39-B479-4EAD-9D1B-25702D54AA7D}" type="datetimeFigureOut">
               <a:rPr lang="cs-CZ" smtClean="0"/>
-              <a:t>03.12.2016</a:t>
+              <a:t>10.12.2016</a:t>
             </a:fld>
             <a:endParaRPr lang="cs-CZ"/>
           </a:p>
@@ -4113,7 +4359,7 @@
           <a:p>
             <a:fld id="{E67B6E39-B479-4EAD-9D1B-25702D54AA7D}" type="datetimeFigureOut">
               <a:rPr lang="cs-CZ" smtClean="0"/>
-              <a:t>03.12.2016</a:t>
+              <a:t>10.12.2016</a:t>
             </a:fld>
             <a:endParaRPr lang="cs-CZ"/>
           </a:p>
@@ -4480,7 +4726,7 @@
           <a:p>
             <a:fld id="{E67B6E39-B479-4EAD-9D1B-25702D54AA7D}" type="datetimeFigureOut">
               <a:rPr lang="cs-CZ" smtClean="0"/>
-              <a:t>03.12.2016</a:t>
+              <a:t>10.12.2016</a:t>
             </a:fld>
             <a:endParaRPr lang="cs-CZ"/>
           </a:p>
@@ -4598,7 +4844,7 @@
           <a:p>
             <a:fld id="{E67B6E39-B479-4EAD-9D1B-25702D54AA7D}" type="datetimeFigureOut">
               <a:rPr lang="cs-CZ" smtClean="0"/>
-              <a:t>03.12.2016</a:t>
+              <a:t>10.12.2016</a:t>
             </a:fld>
             <a:endParaRPr lang="cs-CZ"/>
           </a:p>
@@ -4693,7 +4939,7 @@
           <a:p>
             <a:fld id="{E67B6E39-B479-4EAD-9D1B-25702D54AA7D}" type="datetimeFigureOut">
               <a:rPr lang="cs-CZ" smtClean="0"/>
-              <a:t>03.12.2016</a:t>
+              <a:t>10.12.2016</a:t>
             </a:fld>
             <a:endParaRPr lang="cs-CZ"/>
           </a:p>
@@ -4970,7 +5216,7 @@
           <a:p>
             <a:fld id="{E67B6E39-B479-4EAD-9D1B-25702D54AA7D}" type="datetimeFigureOut">
               <a:rPr lang="cs-CZ" smtClean="0"/>
-              <a:t>03.12.2016</a:t>
+              <a:t>10.12.2016</a:t>
             </a:fld>
             <a:endParaRPr lang="cs-CZ"/>
           </a:p>
@@ -5223,7 +5469,7 @@
           <a:p>
             <a:fld id="{E67B6E39-B479-4EAD-9D1B-25702D54AA7D}" type="datetimeFigureOut">
               <a:rPr lang="cs-CZ" smtClean="0"/>
-              <a:t>03.12.2016</a:t>
+              <a:t>10.12.2016</a:t>
             </a:fld>
             <a:endParaRPr lang="cs-CZ"/>
           </a:p>
@@ -5436,7 +5682,7 @@
           <a:p>
             <a:fld id="{E67B6E39-B479-4EAD-9D1B-25702D54AA7D}" type="datetimeFigureOut">
               <a:rPr lang="cs-CZ" smtClean="0"/>
-              <a:t>03.12.2016</a:t>
+              <a:t>10.12.2016</a:t>
             </a:fld>
             <a:endParaRPr lang="cs-CZ"/>
           </a:p>
@@ -6255,7 +6501,7 @@
           <a:p>
             <a:r>
               <a:rPr lang="cs-CZ" dirty="0"/>
-              <a:t>Komunikace dvou zařízené</a:t>
+              <a:t>Komunikace dvou zařízení</a:t>
             </a:r>
           </a:p>
           <a:p>
@@ -6437,6 +6683,174 @@
 </file>
 
 <file path=ppt/slides/slide13.xml><?xml version="1.0" encoding="utf-8"?>
+<p:sld xmlns:a="http://schemas.openxmlformats.org/drawingml/2006/main" xmlns:r="http://schemas.openxmlformats.org/officeDocument/2006/relationships" xmlns:p="http://schemas.openxmlformats.org/presentationml/2006/main">
+  <p:cSld>
+    <p:spTree>
+      <p:nvGrpSpPr>
+        <p:cNvPr id="1" name=""/>
+        <p:cNvGrpSpPr/>
+        <p:nvPr/>
+      </p:nvGrpSpPr>
+      <p:grpSpPr>
+        <a:xfrm>
+          <a:off x="0" y="0"/>
+          <a:ext cx="0" cy="0"/>
+          <a:chOff x="0" y="0"/>
+          <a:chExt cx="0" cy="0"/>
+        </a:xfrm>
+      </p:grpSpPr>
+      <p:sp>
+        <p:nvSpPr>
+          <p:cNvPr id="2" name="Title 1"/>
+          <p:cNvSpPr>
+            <a:spLocks noGrp="1"/>
+          </p:cNvSpPr>
+          <p:nvPr>
+            <p:ph type="title"/>
+          </p:nvPr>
+        </p:nvSpPr>
+        <p:spPr/>
+        <p:txBody>
+          <a:bodyPr/>
+          <a:lstStyle/>
+          <a:p>
+            <a:r>
+              <a:rPr lang="cs-CZ" dirty="0"/>
+              <a:t>RGB</a:t>
+            </a:r>
+          </a:p>
+        </p:txBody>
+      </p:sp>
+      <p:pic>
+        <p:nvPicPr>
+          <p:cNvPr id="4" name="Picture 3"/>
+          <p:cNvPicPr>
+            <a:picLocks noChangeAspect="1"/>
+          </p:cNvPicPr>
+          <p:nvPr/>
+        </p:nvPicPr>
+        <p:blipFill>
+          <a:blip r:embed="rId3">
+            <a:extLst>
+              <a:ext uri="{28A0092B-C50C-407E-A947-70E740481C1C}">
+                <a14:useLocalDpi xmlns:a14="http://schemas.microsoft.com/office/drawing/2010/main" val="0"/>
+              </a:ext>
+            </a:extLst>
+          </a:blip>
+          <a:stretch>
+            <a:fillRect/>
+          </a:stretch>
+        </p:blipFill>
+        <p:spPr>
+          <a:xfrm>
+            <a:off x="3403295" y="1941371"/>
+            <a:ext cx="5385410" cy="4103170"/>
+          </a:xfrm>
+          <a:prstGeom prst="rect">
+            <a:avLst/>
+          </a:prstGeom>
+        </p:spPr>
+      </p:pic>
+    </p:spTree>
+    <p:extLst>
+      <p:ext uri="{BB962C8B-B14F-4D97-AF65-F5344CB8AC3E}">
+        <p14:creationId xmlns:p14="http://schemas.microsoft.com/office/powerpoint/2010/main" val="1053507403"/>
+      </p:ext>
+    </p:extLst>
+  </p:cSld>
+  <p:clrMapOvr>
+    <a:masterClrMapping/>
+  </p:clrMapOvr>
+</p:sld>
+</file>
+
+<file path=ppt/slides/slide14.xml><?xml version="1.0" encoding="utf-8"?>
+<p:sld xmlns:a="http://schemas.openxmlformats.org/drawingml/2006/main" xmlns:r="http://schemas.openxmlformats.org/officeDocument/2006/relationships" xmlns:p="http://schemas.openxmlformats.org/presentationml/2006/main">
+  <p:cSld>
+    <p:spTree>
+      <p:nvGrpSpPr>
+        <p:cNvPr id="1" name=""/>
+        <p:cNvGrpSpPr/>
+        <p:nvPr/>
+      </p:nvGrpSpPr>
+      <p:grpSpPr>
+        <a:xfrm>
+          <a:off x="0" y="0"/>
+          <a:ext cx="0" cy="0"/>
+          <a:chOff x="0" y="0"/>
+          <a:chExt cx="0" cy="0"/>
+        </a:xfrm>
+      </p:grpSpPr>
+      <p:sp>
+        <p:nvSpPr>
+          <p:cNvPr id="2" name="Title 1"/>
+          <p:cNvSpPr>
+            <a:spLocks noGrp="1"/>
+          </p:cNvSpPr>
+          <p:nvPr>
+            <p:ph type="title"/>
+          </p:nvPr>
+        </p:nvSpPr>
+        <p:spPr/>
+        <p:txBody>
+          <a:bodyPr/>
+          <a:lstStyle/>
+          <a:p>
+            <a:r>
+              <a:rPr lang="en-US" dirty="0"/>
+              <a:t>PWM</a:t>
+            </a:r>
+            <a:endParaRPr lang="cs-CZ" dirty="0"/>
+          </a:p>
+        </p:txBody>
+      </p:sp>
+      <p:pic>
+        <p:nvPicPr>
+          <p:cNvPr id="3" name="Picture 2" descr="https://www.arduino.cc/en/uploads/Tutorial/pwm.gif"/>
+          <p:cNvPicPr/>
+          <p:nvPr/>
+        </p:nvPicPr>
+        <p:blipFill>
+          <a:blip r:embed="rId3">
+            <a:extLst>
+              <a:ext uri="{28A0092B-C50C-407E-A947-70E740481C1C}">
+                <a14:useLocalDpi xmlns:a14="http://schemas.microsoft.com/office/drawing/2010/main" val="0"/>
+              </a:ext>
+            </a:extLst>
+          </a:blip>
+          <a:srcRect/>
+          <a:stretch>
+            <a:fillRect/>
+          </a:stretch>
+        </p:blipFill>
+        <p:spPr bwMode="auto">
+          <a:xfrm>
+            <a:off x="3857759" y="1523262"/>
+            <a:ext cx="4476482" cy="4901748"/>
+          </a:xfrm>
+          <a:prstGeom prst="rect">
+            <a:avLst/>
+          </a:prstGeom>
+          <a:noFill/>
+          <a:ln>
+            <a:noFill/>
+          </a:ln>
+        </p:spPr>
+      </p:pic>
+    </p:spTree>
+    <p:extLst>
+      <p:ext uri="{BB962C8B-B14F-4D97-AF65-F5344CB8AC3E}">
+        <p14:creationId xmlns:p14="http://schemas.microsoft.com/office/powerpoint/2010/main" val="943987075"/>
+      </p:ext>
+    </p:extLst>
+  </p:cSld>
+  <p:clrMapOvr>
+    <a:masterClrMapping/>
+  </p:clrMapOvr>
+</p:sld>
+</file>
+
+<file path=ppt/slides/slide15.xml><?xml version="1.0" encoding="utf-8"?>
 <p:sld xmlns:a="http://schemas.openxmlformats.org/drawingml/2006/main" xmlns:r="http://schemas.openxmlformats.org/officeDocument/2006/relationships" xmlns:p="http://schemas.openxmlformats.org/presentationml/2006/main">
   <p:cSld>
     <p:spTree>
@@ -6518,7 +6932,7 @@
 </p:sld>
 </file>
 
-<file path=ppt/slides/slide14.xml><?xml version="1.0" encoding="utf-8"?>
+<file path=ppt/slides/slide16.xml><?xml version="1.0" encoding="utf-8"?>
 <p:sld xmlns:a="http://schemas.openxmlformats.org/drawingml/2006/main" xmlns:r="http://schemas.openxmlformats.org/officeDocument/2006/relationships" xmlns:p="http://schemas.openxmlformats.org/presentationml/2006/main">
   <p:cSld>
     <p:spTree>
@@ -6679,7 +7093,7 @@
 </p:sld>
 </file>
 
-<file path=ppt/slides/slide15.xml><?xml version="1.0" encoding="utf-8"?>
+<file path=ppt/slides/slide17.xml><?xml version="1.0" encoding="utf-8"?>
 <p:sld xmlns:a="http://schemas.openxmlformats.org/drawingml/2006/main" xmlns:r="http://schemas.openxmlformats.org/officeDocument/2006/relationships" xmlns:p="http://schemas.openxmlformats.org/presentationml/2006/main">
   <p:cSld>
     <p:spTree>
@@ -6729,174 +7143,6 @@
     <p:extLst>
       <p:ext uri="{BB962C8B-B14F-4D97-AF65-F5344CB8AC3E}">
         <p14:creationId xmlns:p14="http://schemas.microsoft.com/office/powerpoint/2010/main" val="466381958"/>
-      </p:ext>
-    </p:extLst>
-  </p:cSld>
-  <p:clrMapOvr>
-    <a:masterClrMapping/>
-  </p:clrMapOvr>
-</p:sld>
-</file>
-
-<file path=ppt/slides/slide16.xml><?xml version="1.0" encoding="utf-8"?>
-<p:sld xmlns:a="http://schemas.openxmlformats.org/drawingml/2006/main" xmlns:r="http://schemas.openxmlformats.org/officeDocument/2006/relationships" xmlns:p="http://schemas.openxmlformats.org/presentationml/2006/main">
-  <p:cSld>
-    <p:spTree>
-      <p:nvGrpSpPr>
-        <p:cNvPr id="1" name=""/>
-        <p:cNvGrpSpPr/>
-        <p:nvPr/>
-      </p:nvGrpSpPr>
-      <p:grpSpPr>
-        <a:xfrm>
-          <a:off x="0" y="0"/>
-          <a:ext cx="0" cy="0"/>
-          <a:chOff x="0" y="0"/>
-          <a:chExt cx="0" cy="0"/>
-        </a:xfrm>
-      </p:grpSpPr>
-      <p:sp>
-        <p:nvSpPr>
-          <p:cNvPr id="2" name="Title 1"/>
-          <p:cNvSpPr>
-            <a:spLocks noGrp="1"/>
-          </p:cNvSpPr>
-          <p:nvPr>
-            <p:ph type="title"/>
-          </p:nvPr>
-        </p:nvSpPr>
-        <p:spPr/>
-        <p:txBody>
-          <a:bodyPr/>
-          <a:lstStyle/>
-          <a:p>
-            <a:r>
-              <a:rPr lang="cs-CZ" dirty="0"/>
-              <a:t>RGB</a:t>
-            </a:r>
-          </a:p>
-        </p:txBody>
-      </p:sp>
-      <p:pic>
-        <p:nvPicPr>
-          <p:cNvPr id="4" name="Picture 3"/>
-          <p:cNvPicPr>
-            <a:picLocks noChangeAspect="1"/>
-          </p:cNvPicPr>
-          <p:nvPr/>
-        </p:nvPicPr>
-        <p:blipFill>
-          <a:blip r:embed="rId3">
-            <a:extLst>
-              <a:ext uri="{28A0092B-C50C-407E-A947-70E740481C1C}">
-                <a14:useLocalDpi xmlns:a14="http://schemas.microsoft.com/office/drawing/2010/main" val="0"/>
-              </a:ext>
-            </a:extLst>
-          </a:blip>
-          <a:stretch>
-            <a:fillRect/>
-          </a:stretch>
-        </p:blipFill>
-        <p:spPr>
-          <a:xfrm>
-            <a:off x="3403295" y="1941371"/>
-            <a:ext cx="5385410" cy="4103170"/>
-          </a:xfrm>
-          <a:prstGeom prst="rect">
-            <a:avLst/>
-          </a:prstGeom>
-        </p:spPr>
-      </p:pic>
-    </p:spTree>
-    <p:extLst>
-      <p:ext uri="{BB962C8B-B14F-4D97-AF65-F5344CB8AC3E}">
-        <p14:creationId xmlns:p14="http://schemas.microsoft.com/office/powerpoint/2010/main" val="1053507403"/>
-      </p:ext>
-    </p:extLst>
-  </p:cSld>
-  <p:clrMapOvr>
-    <a:masterClrMapping/>
-  </p:clrMapOvr>
-</p:sld>
-</file>
-
-<file path=ppt/slides/slide17.xml><?xml version="1.0" encoding="utf-8"?>
-<p:sld xmlns:a="http://schemas.openxmlformats.org/drawingml/2006/main" xmlns:r="http://schemas.openxmlformats.org/officeDocument/2006/relationships" xmlns:p="http://schemas.openxmlformats.org/presentationml/2006/main">
-  <p:cSld>
-    <p:spTree>
-      <p:nvGrpSpPr>
-        <p:cNvPr id="1" name=""/>
-        <p:cNvGrpSpPr/>
-        <p:nvPr/>
-      </p:nvGrpSpPr>
-      <p:grpSpPr>
-        <a:xfrm>
-          <a:off x="0" y="0"/>
-          <a:ext cx="0" cy="0"/>
-          <a:chOff x="0" y="0"/>
-          <a:chExt cx="0" cy="0"/>
-        </a:xfrm>
-      </p:grpSpPr>
-      <p:sp>
-        <p:nvSpPr>
-          <p:cNvPr id="2" name="Title 1"/>
-          <p:cNvSpPr>
-            <a:spLocks noGrp="1"/>
-          </p:cNvSpPr>
-          <p:nvPr>
-            <p:ph type="title"/>
-          </p:nvPr>
-        </p:nvSpPr>
-        <p:spPr/>
-        <p:txBody>
-          <a:bodyPr/>
-          <a:lstStyle/>
-          <a:p>
-            <a:r>
-              <a:rPr lang="en-US" dirty="0"/>
-              <a:t>PWM</a:t>
-            </a:r>
-            <a:endParaRPr lang="cs-CZ" dirty="0"/>
-          </a:p>
-        </p:txBody>
-      </p:sp>
-      <p:pic>
-        <p:nvPicPr>
-          <p:cNvPr id="3" name="Picture 2" descr="https://www.arduino.cc/en/uploads/Tutorial/pwm.gif"/>
-          <p:cNvPicPr/>
-          <p:nvPr/>
-        </p:nvPicPr>
-        <p:blipFill>
-          <a:blip r:embed="rId3">
-            <a:extLst>
-              <a:ext uri="{28A0092B-C50C-407E-A947-70E740481C1C}">
-                <a14:useLocalDpi xmlns:a14="http://schemas.microsoft.com/office/drawing/2010/main" val="0"/>
-              </a:ext>
-            </a:extLst>
-          </a:blip>
-          <a:srcRect/>
-          <a:stretch>
-            <a:fillRect/>
-          </a:stretch>
-        </p:blipFill>
-        <p:spPr bwMode="auto">
-          <a:xfrm>
-            <a:off x="3857759" y="1523262"/>
-            <a:ext cx="4476482" cy="4901748"/>
-          </a:xfrm>
-          <a:prstGeom prst="rect">
-            <a:avLst/>
-          </a:prstGeom>
-          <a:noFill/>
-          <a:ln>
-            <a:noFill/>
-          </a:ln>
-        </p:spPr>
-      </p:pic>
-    </p:spTree>
-    <p:extLst>
-      <p:ext uri="{BB962C8B-B14F-4D97-AF65-F5344CB8AC3E}">
-        <p14:creationId xmlns:p14="http://schemas.microsoft.com/office/powerpoint/2010/main" val="943987075"/>
       </p:ext>
     </p:extLst>
   </p:cSld>
@@ -15436,6 +15682,384 @@
 </p:sld>
 </file>
 
+<file path=ppt/slides/slide24.xml><?xml version="1.0" encoding="utf-8"?>
+<p:sld xmlns:a="http://schemas.openxmlformats.org/drawingml/2006/main" xmlns:r="http://schemas.openxmlformats.org/officeDocument/2006/relationships" xmlns:p="http://schemas.openxmlformats.org/presentationml/2006/main">
+  <p:cSld>
+    <p:spTree>
+      <p:nvGrpSpPr>
+        <p:cNvPr id="1" name=""/>
+        <p:cNvGrpSpPr/>
+        <p:nvPr/>
+      </p:nvGrpSpPr>
+      <p:grpSpPr>
+        <a:xfrm>
+          <a:off x="0" y="0"/>
+          <a:ext cx="0" cy="0"/>
+          <a:chOff x="0" y="0"/>
+          <a:chExt cx="0" cy="0"/>
+        </a:xfrm>
+      </p:grpSpPr>
+      <p:sp>
+        <p:nvSpPr>
+          <p:cNvPr id="2" name="Title 1"/>
+          <p:cNvSpPr>
+            <a:spLocks noGrp="1"/>
+          </p:cNvSpPr>
+          <p:nvPr>
+            <p:ph type="title"/>
+          </p:nvPr>
+        </p:nvSpPr>
+        <p:spPr/>
+        <p:txBody>
+          <a:bodyPr/>
+          <a:lstStyle/>
+          <a:p>
+            <a:r>
+              <a:rPr lang="cs-CZ" dirty="0"/>
+              <a:t>Hodiny reálného času bez knihovny</a:t>
+            </a:r>
+          </a:p>
+        </p:txBody>
+      </p:sp>
+      <p:pic>
+        <p:nvPicPr>
+          <p:cNvPr id="3" name="Picture 2"/>
+          <p:cNvPicPr/>
+          <p:nvPr/>
+        </p:nvPicPr>
+        <p:blipFill>
+          <a:blip r:embed="rId3"/>
+          <a:stretch>
+            <a:fillRect/>
+          </a:stretch>
+        </p:blipFill>
+        <p:spPr>
+          <a:xfrm>
+            <a:off x="794304" y="1919654"/>
+            <a:ext cx="10603391" cy="3802120"/>
+          </a:xfrm>
+          <a:prstGeom prst="rect">
+            <a:avLst/>
+          </a:prstGeom>
+        </p:spPr>
+      </p:pic>
+    </p:spTree>
+    <p:extLst>
+      <p:ext uri="{BB962C8B-B14F-4D97-AF65-F5344CB8AC3E}">
+        <p14:creationId xmlns:p14="http://schemas.microsoft.com/office/powerpoint/2010/main" val="1119364035"/>
+      </p:ext>
+    </p:extLst>
+  </p:cSld>
+  <p:clrMapOvr>
+    <a:masterClrMapping/>
+  </p:clrMapOvr>
+</p:sld>
+</file>
+
+<file path=ppt/slides/slide25.xml><?xml version="1.0" encoding="utf-8"?>
+<p:sld xmlns:a="http://schemas.openxmlformats.org/drawingml/2006/main" xmlns:r="http://schemas.openxmlformats.org/officeDocument/2006/relationships" xmlns:p="http://schemas.openxmlformats.org/presentationml/2006/main">
+  <p:cSld>
+    <p:spTree>
+      <p:nvGrpSpPr>
+        <p:cNvPr id="1" name=""/>
+        <p:cNvGrpSpPr/>
+        <p:nvPr/>
+      </p:nvGrpSpPr>
+      <p:grpSpPr>
+        <a:xfrm>
+          <a:off x="0" y="0"/>
+          <a:ext cx="0" cy="0"/>
+          <a:chOff x="0" y="0"/>
+          <a:chExt cx="0" cy="0"/>
+        </a:xfrm>
+      </p:grpSpPr>
+      <p:sp>
+        <p:nvSpPr>
+          <p:cNvPr id="2" name="Title 1"/>
+          <p:cNvSpPr>
+            <a:spLocks noGrp="1"/>
+          </p:cNvSpPr>
+          <p:nvPr>
+            <p:ph type="title"/>
+          </p:nvPr>
+        </p:nvSpPr>
+        <p:spPr/>
+        <p:txBody>
+          <a:bodyPr/>
+          <a:lstStyle/>
+          <a:p>
+            <a:r>
+              <a:rPr lang="cs-CZ" dirty="0"/>
+              <a:t>Maska a bitový posun</a:t>
+            </a:r>
+          </a:p>
+        </p:txBody>
+      </p:sp>
+      <p:sp>
+        <p:nvSpPr>
+          <p:cNvPr id="4" name="Zástupný symbol pro obsah 3"/>
+          <p:cNvSpPr>
+            <a:spLocks noGrp="1"/>
+          </p:cNvSpPr>
+          <p:nvPr>
+            <p:ph idx="1"/>
+          </p:nvPr>
+        </p:nvSpPr>
+        <p:spPr>
+          <a:xfrm>
+            <a:off x="838200" y="4152719"/>
+            <a:ext cx="10515600" cy="1754096"/>
+          </a:xfrm>
+        </p:spPr>
+        <p:txBody>
+          <a:bodyPr>
+            <a:normAutofit/>
+          </a:bodyPr>
+          <a:lstStyle/>
+          <a:p>
+            <a:pPr marL="514350" indent="-514350">
+              <a:buFont typeface="+mj-lt"/>
+              <a:buAutoNum type="arabicPeriod"/>
+            </a:pPr>
+            <a:r>
+              <a:rPr lang="cs-CZ" dirty="0"/>
+              <a:t>Použít masku na bit 6 – 4</a:t>
+            </a:r>
+          </a:p>
+          <a:p>
+            <a:pPr marL="514350" indent="-514350">
+              <a:buFont typeface="+mj-lt"/>
+              <a:buAutoNum type="arabicPeriod"/>
+            </a:pPr>
+            <a:r>
+              <a:rPr lang="cs-CZ" dirty="0"/>
+              <a:t>Posunout o 4 bit doprava</a:t>
+            </a:r>
+            <a:endParaRPr lang="en-US" dirty="0"/>
+          </a:p>
+          <a:p>
+            <a:pPr marL="514350" indent="-514350">
+              <a:buFont typeface="+mj-lt"/>
+              <a:buAutoNum type="arabicPeriod"/>
+            </a:pPr>
+            <a:r>
+              <a:rPr lang="cs-CZ" dirty="0"/>
+              <a:t>Vynásobit 10 (načítíme desítky vteřin)</a:t>
+            </a:r>
+          </a:p>
+        </p:txBody>
+      </p:sp>
+      <p:grpSp>
+        <p:nvGrpSpPr>
+          <p:cNvPr id="37" name="Skupina 36"/>
+          <p:cNvGrpSpPr/>
+          <p:nvPr/>
+        </p:nvGrpSpPr>
+        <p:grpSpPr>
+          <a:xfrm>
+            <a:off x="1752187" y="1457711"/>
+            <a:ext cx="8687626" cy="2152025"/>
+            <a:chOff x="1752187" y="1457711"/>
+            <a:chExt cx="8687626" cy="2152025"/>
+          </a:xfrm>
+        </p:grpSpPr>
+        <p:pic>
+          <p:nvPicPr>
+            <p:cNvPr id="3" name="Obrázek 2"/>
+            <p:cNvPicPr>
+              <a:picLocks noChangeAspect="1"/>
+            </p:cNvPicPr>
+            <p:nvPr/>
+          </p:nvPicPr>
+          <p:blipFill>
+            <a:blip r:embed="rId3"/>
+            <a:stretch>
+              <a:fillRect/>
+            </a:stretch>
+          </p:blipFill>
+          <p:spPr>
+            <a:xfrm>
+              <a:off x="1752187" y="1457711"/>
+              <a:ext cx="8687626" cy="895758"/>
+            </a:xfrm>
+            <a:prstGeom prst="rect">
+              <a:avLst/>
+            </a:prstGeom>
+          </p:spPr>
+        </p:pic>
+        <p:sp>
+          <p:nvSpPr>
+            <p:cNvPr id="15" name="TextovéPole 14"/>
+            <p:cNvSpPr txBox="1"/>
+            <p:nvPr/>
+          </p:nvSpPr>
+          <p:spPr>
+            <a:xfrm>
+              <a:off x="4068040" y="3148071"/>
+              <a:ext cx="5715026" cy="461665"/>
+            </a:xfrm>
+            <a:prstGeom prst="rect">
+              <a:avLst/>
+            </a:prstGeom>
+            <a:noFill/>
+          </p:spPr>
+          <p:txBody>
+            <a:bodyPr wrap="none" rtlCol="0">
+              <a:spAutoFit/>
+            </a:bodyPr>
+            <a:lstStyle/>
+            <a:p>
+              <a:r>
+                <a:rPr lang="en-US" sz="2400" b="1" dirty="0">
+                  <a:latin typeface="Courier New" panose="02070309020205020404" pitchFamily="49" charset="0"/>
+                  <a:cs typeface="Courier New" panose="02070309020205020404" pitchFamily="49" charset="0"/>
+                </a:rPr>
+                <a:t>(</a:t>
+              </a:r>
+              <a:r>
+                <a:rPr lang="cs-CZ" sz="2400" b="1" dirty="0">
+                  <a:latin typeface="Courier New" panose="02070309020205020404" pitchFamily="49" charset="0"/>
+                  <a:cs typeface="Courier New" panose="02070309020205020404" pitchFamily="49" charset="0"/>
+                </a:rPr>
+                <a:t>( s &amp; 0b01110000 ) &gt;&gt; 4</a:t>
+              </a:r>
+              <a:r>
+                <a:rPr lang="en-US" sz="2400" b="1" dirty="0">
+                  <a:latin typeface="Courier New" panose="02070309020205020404" pitchFamily="49" charset="0"/>
+                  <a:cs typeface="Courier New" panose="02070309020205020404" pitchFamily="49" charset="0"/>
+                </a:rPr>
+                <a:t>) * 10</a:t>
+              </a:r>
+              <a:endParaRPr lang="cs-CZ" sz="2400" b="1" dirty="0">
+                <a:latin typeface="Courier New" panose="02070309020205020404" pitchFamily="49" charset="0"/>
+                <a:cs typeface="Courier New" panose="02070309020205020404" pitchFamily="49" charset="0"/>
+              </a:endParaRPr>
+            </a:p>
+          </p:txBody>
+        </p:sp>
+        <p:cxnSp>
+          <p:nvCxnSpPr>
+            <p:cNvPr id="18" name="Přímá spojnice se šipkou 17"/>
+            <p:cNvCxnSpPr/>
+            <p:nvPr/>
+          </p:nvCxnSpPr>
+          <p:spPr>
+            <a:xfrm>
+              <a:off x="4663440" y="2353469"/>
+              <a:ext cx="1306286" cy="794602"/>
+            </a:xfrm>
+            <a:prstGeom prst="straightConnector1">
+              <a:avLst/>
+            </a:prstGeom>
+            <a:ln>
+              <a:tailEnd type="triangle"/>
+            </a:ln>
+          </p:spPr>
+          <p:style>
+            <a:lnRef idx="1">
+              <a:schemeClr val="accent1"/>
+            </a:lnRef>
+            <a:fillRef idx="0">
+              <a:schemeClr val="accent1"/>
+            </a:fillRef>
+            <a:effectRef idx="0">
+              <a:schemeClr val="accent1"/>
+            </a:effectRef>
+            <a:fontRef idx="minor">
+              <a:schemeClr val="tx1"/>
+            </a:fontRef>
+          </p:style>
+        </p:cxnSp>
+        <p:cxnSp>
+          <p:nvCxnSpPr>
+            <p:cNvPr id="22" name="Pravoúhlá spojnice 21"/>
+            <p:cNvCxnSpPr/>
+            <p:nvPr/>
+          </p:nvCxnSpPr>
+          <p:spPr>
+            <a:xfrm>
+              <a:off x="1752187" y="2132473"/>
+              <a:ext cx="2741436" cy="1246430"/>
+            </a:xfrm>
+            <a:prstGeom prst="bentConnector3">
+              <a:avLst>
+                <a:gd name="adj1" fmla="val -16233"/>
+              </a:avLst>
+            </a:prstGeom>
+            <a:ln>
+              <a:tailEnd type="triangle"/>
+            </a:ln>
+          </p:spPr>
+          <p:style>
+            <a:lnRef idx="1">
+              <a:schemeClr val="accent1"/>
+            </a:lnRef>
+            <a:fillRef idx="0">
+              <a:schemeClr val="accent1"/>
+            </a:fillRef>
+            <a:effectRef idx="0">
+              <a:schemeClr val="accent1"/>
+            </a:effectRef>
+            <a:fontRef idx="minor">
+              <a:schemeClr val="tx1"/>
+            </a:fontRef>
+          </p:style>
+        </p:cxnSp>
+        <p:sp>
+          <p:nvSpPr>
+            <p:cNvPr id="30" name="Levá složená závorka 29"/>
+            <p:cNvSpPr/>
+            <p:nvPr/>
+          </p:nvSpPr>
+          <p:spPr>
+            <a:xfrm rot="16200000">
+              <a:off x="6566697" y="1485166"/>
+              <a:ext cx="896118" cy="2429691"/>
+            </a:xfrm>
+            <a:prstGeom prst="leftBrace">
+              <a:avLst>
+                <a:gd name="adj1" fmla="val 8333"/>
+                <a:gd name="adj2" fmla="val 98547"/>
+              </a:avLst>
+            </a:prstGeom>
+          </p:spPr>
+          <p:style>
+            <a:lnRef idx="1">
+              <a:schemeClr val="accent1"/>
+            </a:lnRef>
+            <a:fillRef idx="0">
+              <a:schemeClr val="accent1"/>
+            </a:fillRef>
+            <a:effectRef idx="0">
+              <a:schemeClr val="accent1"/>
+            </a:effectRef>
+            <a:fontRef idx="minor">
+              <a:schemeClr val="tx1"/>
+            </a:fontRef>
+          </p:style>
+          <p:txBody>
+            <a:bodyPr rtlCol="0" anchor="ctr"/>
+            <a:lstStyle/>
+            <a:p>
+              <a:pPr algn="ctr"/>
+              <a:endParaRPr lang="cs-CZ"/>
+            </a:p>
+          </p:txBody>
+        </p:sp>
+      </p:grpSp>
+    </p:spTree>
+    <p:extLst>
+      <p:ext uri="{BB962C8B-B14F-4D97-AF65-F5344CB8AC3E}">
+        <p14:creationId xmlns:p14="http://schemas.microsoft.com/office/powerpoint/2010/main" val="2763558672"/>
+      </p:ext>
+    </p:extLst>
+  </p:cSld>
+  <p:clrMapOvr>
+    <a:masterClrMapping/>
+  </p:clrMapOvr>
+</p:sld>
+</file>
+
 <file path=ppt/slides/slide3.xml><?xml version="1.0" encoding="utf-8"?>
 <p:sld xmlns:a="http://schemas.openxmlformats.org/drawingml/2006/main" xmlns:r="http://schemas.openxmlformats.org/officeDocument/2006/relationships" xmlns:p="http://schemas.openxmlformats.org/presentationml/2006/main">
   <p:cSld>
@@ -15601,7 +16225,7 @@
       </p:grpSpPr>
       <p:sp>
         <p:nvSpPr>
-          <p:cNvPr id="2" name="Title 1"/>
+          <p:cNvPr id="2" name="Nadpis 1"/>
           <p:cNvSpPr>
             <a:spLocks noGrp="1"/>
           </p:cNvSpPr>
@@ -15616,14 +16240,14 @@
           <a:p>
             <a:r>
               <a:rPr lang="cs-CZ" dirty="0"/>
-              <a:t>Arduino IDE</a:t>
-            </a:r>
-          </a:p>
-        </p:txBody>
-      </p:sp>
-      <p:sp>
-        <p:nvSpPr>
-          <p:cNvPr id="3" name="Content Placeholder 2"/>
+              <a:t>Ovladač pro převodník USB – Sériový port</a:t>
+            </a:r>
+          </a:p>
+        </p:txBody>
+      </p:sp>
+      <p:sp>
+        <p:nvSpPr>
+          <p:cNvPr id="3" name="Zástupný symbol pro obsah 2"/>
           <p:cNvSpPr>
             <a:spLocks noGrp="1"/>
           </p:cNvSpPr>
@@ -15638,116 +16262,6 @@
           <a:p>
             <a:r>
               <a:rPr lang="cs-CZ" dirty="0"/>
-              <a:t>Multiplatformní</a:t>
-            </a:r>
-          </a:p>
-          <a:p>
-            <a:r>
-              <a:rPr lang="cs-CZ" dirty="0"/>
-              <a:t>Editor s programátorem</a:t>
-            </a:r>
-          </a:p>
-          <a:p>
-            <a:r>
-              <a:rPr lang="cs-CZ" dirty="0"/>
-              <a:t>Musí se správně nastavit typ Arduino a port</a:t>
-            </a:r>
-          </a:p>
-        </p:txBody>
-      </p:sp>
-      <p:pic>
-        <p:nvPicPr>
-          <p:cNvPr id="4" name="Picture 3"/>
-          <p:cNvPicPr>
-            <a:picLocks noChangeAspect="1"/>
-          </p:cNvPicPr>
-          <p:nvPr/>
-        </p:nvPicPr>
-        <p:blipFill>
-          <a:blip r:embed="rId3"/>
-          <a:stretch>
-            <a:fillRect/>
-          </a:stretch>
-        </p:blipFill>
-        <p:spPr>
-          <a:xfrm>
-            <a:off x="3344091" y="3308907"/>
-            <a:ext cx="6380934" cy="3324450"/>
-          </a:xfrm>
-          <a:prstGeom prst="rect">
-            <a:avLst/>
-          </a:prstGeom>
-        </p:spPr>
-      </p:pic>
-    </p:spTree>
-    <p:extLst>
-      <p:ext uri="{BB962C8B-B14F-4D97-AF65-F5344CB8AC3E}">
-        <p14:creationId xmlns:p14="http://schemas.microsoft.com/office/powerpoint/2010/main" val="760035357"/>
-      </p:ext>
-    </p:extLst>
-  </p:cSld>
-  <p:clrMapOvr>
-    <a:masterClrMapping/>
-  </p:clrMapOvr>
-</p:sld>
-</file>
-
-<file path=ppt/slides/slide5.xml><?xml version="1.0" encoding="utf-8"?>
-<p:sld xmlns:a="http://schemas.openxmlformats.org/drawingml/2006/main" xmlns:r="http://schemas.openxmlformats.org/officeDocument/2006/relationships" xmlns:p="http://schemas.openxmlformats.org/presentationml/2006/main">
-  <p:cSld>
-    <p:spTree>
-      <p:nvGrpSpPr>
-        <p:cNvPr id="1" name=""/>
-        <p:cNvGrpSpPr/>
-        <p:nvPr/>
-      </p:nvGrpSpPr>
-      <p:grpSpPr>
-        <a:xfrm>
-          <a:off x="0" y="0"/>
-          <a:ext cx="0" cy="0"/>
-          <a:chOff x="0" y="0"/>
-          <a:chExt cx="0" cy="0"/>
-        </a:xfrm>
-      </p:grpSpPr>
-      <p:sp>
-        <p:nvSpPr>
-          <p:cNvPr id="2" name="Nadpis 1"/>
-          <p:cNvSpPr>
-            <a:spLocks noGrp="1"/>
-          </p:cNvSpPr>
-          <p:nvPr>
-            <p:ph type="title"/>
-          </p:nvPr>
-        </p:nvSpPr>
-        <p:spPr/>
-        <p:txBody>
-          <a:bodyPr/>
-          <a:lstStyle/>
-          <a:p>
-            <a:r>
-              <a:rPr lang="cs-CZ" dirty="0"/>
-              <a:t>Ovladač pro převodník USB – Sériový port</a:t>
-            </a:r>
-          </a:p>
-        </p:txBody>
-      </p:sp>
-      <p:sp>
-        <p:nvSpPr>
-          <p:cNvPr id="3" name="Zástupný symbol pro obsah 2"/>
-          <p:cNvSpPr>
-            <a:spLocks noGrp="1"/>
-          </p:cNvSpPr>
-          <p:nvPr>
-            <p:ph idx="1"/>
-          </p:nvPr>
-        </p:nvSpPr>
-        <p:spPr/>
-        <p:txBody>
-          <a:bodyPr/>
-          <a:lstStyle/>
-          <a:p>
-            <a:r>
-              <a:rPr lang="cs-CZ" dirty="0"/>
               <a:t>FTDI vs. CH340</a:t>
             </a:r>
           </a:p>
@@ -15768,6 +16282,22 @@
               <a:rPr lang="cs-CZ" dirty="0"/>
               <a:t>10 nutné připojení k internetu</a:t>
             </a:r>
+            <a:endParaRPr lang="en-US" dirty="0"/>
+          </a:p>
+          <a:p>
+            <a:r>
+              <a:rPr lang="en-US" dirty="0"/>
+              <a:t>Linux </a:t>
+            </a:r>
+            <a:r>
+              <a:rPr lang="cs-CZ" dirty="0"/>
+              <a:t>- uživatel ve skupině </a:t>
+            </a:r>
+            <a:r>
+              <a:rPr lang="cs-CZ" i="1" dirty="0" err="1"/>
+              <a:t>dialout</a:t>
+            </a:r>
+            <a:endParaRPr lang="cs-CZ" i="1" dirty="0"/>
           </a:p>
           <a:p>
             <a:r>
@@ -15847,6 +16377,116 @@
     <p:extLst>
       <p:ext uri="{BB962C8B-B14F-4D97-AF65-F5344CB8AC3E}">
         <p14:creationId xmlns:p14="http://schemas.microsoft.com/office/powerpoint/2010/main" val="3781824268"/>
+      </p:ext>
+    </p:extLst>
+  </p:cSld>
+  <p:clrMapOvr>
+    <a:masterClrMapping/>
+  </p:clrMapOvr>
+</p:sld>
+</file>
+
+<file path=ppt/slides/slide5.xml><?xml version="1.0" encoding="utf-8"?>
+<p:sld xmlns:a="http://schemas.openxmlformats.org/drawingml/2006/main" xmlns:r="http://schemas.openxmlformats.org/officeDocument/2006/relationships" xmlns:p="http://schemas.openxmlformats.org/presentationml/2006/main">
+  <p:cSld>
+    <p:spTree>
+      <p:nvGrpSpPr>
+        <p:cNvPr id="1" name=""/>
+        <p:cNvGrpSpPr/>
+        <p:nvPr/>
+      </p:nvGrpSpPr>
+      <p:grpSpPr>
+        <a:xfrm>
+          <a:off x="0" y="0"/>
+          <a:ext cx="0" cy="0"/>
+          <a:chOff x="0" y="0"/>
+          <a:chExt cx="0" cy="0"/>
+        </a:xfrm>
+      </p:grpSpPr>
+      <p:sp>
+        <p:nvSpPr>
+          <p:cNvPr id="2" name="Title 1"/>
+          <p:cNvSpPr>
+            <a:spLocks noGrp="1"/>
+          </p:cNvSpPr>
+          <p:nvPr>
+            <p:ph type="title"/>
+          </p:nvPr>
+        </p:nvSpPr>
+        <p:spPr/>
+        <p:txBody>
+          <a:bodyPr/>
+          <a:lstStyle/>
+          <a:p>
+            <a:r>
+              <a:rPr lang="cs-CZ" dirty="0"/>
+              <a:t>Arduino IDE</a:t>
+            </a:r>
+          </a:p>
+        </p:txBody>
+      </p:sp>
+      <p:sp>
+        <p:nvSpPr>
+          <p:cNvPr id="3" name="Content Placeholder 2"/>
+          <p:cNvSpPr>
+            <a:spLocks noGrp="1"/>
+          </p:cNvSpPr>
+          <p:nvPr>
+            <p:ph idx="1"/>
+          </p:nvPr>
+        </p:nvSpPr>
+        <p:spPr/>
+        <p:txBody>
+          <a:bodyPr/>
+          <a:lstStyle/>
+          <a:p>
+            <a:r>
+              <a:rPr lang="cs-CZ" dirty="0"/>
+              <a:t>Multiplatformní</a:t>
+            </a:r>
+          </a:p>
+          <a:p>
+            <a:r>
+              <a:rPr lang="cs-CZ" dirty="0"/>
+              <a:t>Editor s programátorem</a:t>
+            </a:r>
+          </a:p>
+          <a:p>
+            <a:r>
+              <a:rPr lang="cs-CZ" dirty="0"/>
+              <a:t>Musí se správně nastavit typ Arduino a port</a:t>
+            </a:r>
+          </a:p>
+        </p:txBody>
+      </p:sp>
+      <p:pic>
+        <p:nvPicPr>
+          <p:cNvPr id="4" name="Picture 3"/>
+          <p:cNvPicPr>
+            <a:picLocks noChangeAspect="1"/>
+          </p:cNvPicPr>
+          <p:nvPr/>
+        </p:nvPicPr>
+        <p:blipFill>
+          <a:blip r:embed="rId3"/>
+          <a:stretch>
+            <a:fillRect/>
+          </a:stretch>
+        </p:blipFill>
+        <p:spPr>
+          <a:xfrm>
+            <a:off x="3344091" y="3308907"/>
+            <a:ext cx="6380934" cy="3324450"/>
+          </a:xfrm>
+          <a:prstGeom prst="rect">
+            <a:avLst/>
+          </a:prstGeom>
+        </p:spPr>
+      </p:pic>
+    </p:spTree>
+    <p:extLst>
+      <p:ext uri="{BB962C8B-B14F-4D97-AF65-F5344CB8AC3E}">
+        <p14:creationId xmlns:p14="http://schemas.microsoft.com/office/powerpoint/2010/main" val="760035357"/>
       </p:ext>
     </p:extLst>
   </p:cSld>

</xml_diff>